<commit_message>
Updated ppt and ascii map chars
</commit_message>
<xml_diff>
--- a/ppt/TANGLE.pptx
+++ b/ppt/TANGLE.pptx
@@ -10,8 +10,9 @@
     <p:sldId id="259" r:id="rId4"/>
     <p:sldId id="260" r:id="rId5"/>
     <p:sldId id="261" r:id="rId6"/>
-    <p:sldId id="263" r:id="rId7"/>
-    <p:sldId id="262" r:id="rId8"/>
+    <p:sldId id="264" r:id="rId7"/>
+    <p:sldId id="263" r:id="rId8"/>
+    <p:sldId id="262" r:id="rId9"/>
   </p:sldIdLst>
   <p:sldSz cx="12192000" cy="6858000"/>
   <p:notesSz cx="6858000" cy="9144000"/>
@@ -4398,7 +4399,7 @@
           <a:p>
             <a:fld id="{48A87A34-81AB-432B-8DAE-1953F412C126}" type="datetimeFigureOut">
               <a:rPr lang="en-US" dirty="0"/>
-              <a:t>12/13/2017</a:t>
+              <a:t>12/16/2017</a:t>
             </a:fld>
             <a:endParaRPr lang="en-US" dirty="0"/>
           </a:p>
@@ -4660,7 +4661,7 @@
           <a:p>
             <a:fld id="{48A87A34-81AB-432B-8DAE-1953F412C126}" type="datetimeFigureOut">
               <a:rPr lang="en-US" dirty="0"/>
-              <a:t>12/13/2017</a:t>
+              <a:t>12/16/2017</a:t>
             </a:fld>
             <a:endParaRPr lang="en-US" dirty="0"/>
           </a:p>
@@ -4851,7 +4852,7 @@
           <a:p>
             <a:fld id="{48A87A34-81AB-432B-8DAE-1953F412C126}" type="datetimeFigureOut">
               <a:rPr lang="en-US" dirty="0"/>
-              <a:t>12/13/2017</a:t>
+              <a:t>12/16/2017</a:t>
             </a:fld>
             <a:endParaRPr lang="en-US" dirty="0"/>
           </a:p>
@@ -5109,7 +5110,7 @@
           <a:p>
             <a:fld id="{48A87A34-81AB-432B-8DAE-1953F412C126}" type="datetimeFigureOut">
               <a:rPr lang="en-US" dirty="0"/>
-              <a:t>12/13/2017</a:t>
+              <a:t>12/16/2017</a:t>
             </a:fld>
             <a:endParaRPr lang="en-US" dirty="0"/>
           </a:p>
@@ -5538,7 +5539,7 @@
           <a:p>
             <a:fld id="{48A87A34-81AB-432B-8DAE-1953F412C126}" type="datetimeFigureOut">
               <a:rPr lang="en-US" dirty="0"/>
-              <a:t>12/13/2017</a:t>
+              <a:t>12/16/2017</a:t>
             </a:fld>
             <a:endParaRPr lang="en-US" dirty="0"/>
           </a:p>
@@ -6079,7 +6080,7 @@
           <a:p>
             <a:fld id="{48A87A34-81AB-432B-8DAE-1953F412C126}" type="datetimeFigureOut">
               <a:rPr lang="en-US" dirty="0"/>
-              <a:t>12/13/2017</a:t>
+              <a:t>12/16/2017</a:t>
             </a:fld>
             <a:endParaRPr lang="en-US" dirty="0"/>
           </a:p>
@@ -6794,7 +6795,7 @@
           <a:p>
             <a:fld id="{48A87A34-81AB-432B-8DAE-1953F412C126}" type="datetimeFigureOut">
               <a:rPr lang="en-US" dirty="0"/>
-              <a:t>12/13/2017</a:t>
+              <a:t>12/16/2017</a:t>
             </a:fld>
             <a:endParaRPr lang="en-US" dirty="0"/>
           </a:p>
@@ -6959,7 +6960,7 @@
           <a:p>
             <a:fld id="{48A87A34-81AB-432B-8DAE-1953F412C126}" type="datetimeFigureOut">
               <a:rPr lang="en-US" dirty="0"/>
-              <a:t>12/13/2017</a:t>
+              <a:t>12/16/2017</a:t>
             </a:fld>
             <a:endParaRPr lang="en-US" dirty="0"/>
           </a:p>
@@ -7134,7 +7135,7 @@
           <a:p>
             <a:fld id="{48A87A34-81AB-432B-8DAE-1953F412C126}" type="datetimeFigureOut">
               <a:rPr lang="en-US" dirty="0"/>
-              <a:t>12/13/2017</a:t>
+              <a:t>12/16/2017</a:t>
             </a:fld>
             <a:endParaRPr lang="en-US" dirty="0"/>
           </a:p>
@@ -7299,7 +7300,7 @@
           <a:p>
             <a:fld id="{48A87A34-81AB-432B-8DAE-1953F412C126}" type="datetimeFigureOut">
               <a:rPr lang="en-US" dirty="0"/>
-              <a:t>12/13/2017</a:t>
+              <a:t>12/16/2017</a:t>
             </a:fld>
             <a:endParaRPr lang="en-US" dirty="0"/>
           </a:p>
@@ -7544,7 +7545,7 @@
           <a:p>
             <a:fld id="{48A87A34-81AB-432B-8DAE-1953F412C126}" type="datetimeFigureOut">
               <a:rPr lang="en-US" dirty="0"/>
-              <a:t>12/13/2017</a:t>
+              <a:t>12/16/2017</a:t>
             </a:fld>
             <a:endParaRPr lang="en-US" dirty="0"/>
           </a:p>
@@ -7771,7 +7772,7 @@
           <a:p>
             <a:fld id="{48A87A34-81AB-432B-8DAE-1953F412C126}" type="datetimeFigureOut">
               <a:rPr lang="en-US" dirty="0"/>
-              <a:t>12/13/2017</a:t>
+              <a:t>12/16/2017</a:t>
             </a:fld>
             <a:endParaRPr lang="en-US" dirty="0"/>
           </a:p>
@@ -8147,7 +8148,7 @@
           <a:p>
             <a:fld id="{48A87A34-81AB-432B-8DAE-1953F412C126}" type="datetimeFigureOut">
               <a:rPr lang="en-US" dirty="0"/>
-              <a:t>12/13/2017</a:t>
+              <a:t>12/16/2017</a:t>
             </a:fld>
             <a:endParaRPr lang="en-US" dirty="0"/>
           </a:p>
@@ -8260,7 +8261,7 @@
           <a:p>
             <a:fld id="{48A87A34-81AB-432B-8DAE-1953F412C126}" type="datetimeFigureOut">
               <a:rPr lang="en-US" dirty="0"/>
-              <a:t>12/13/2017</a:t>
+              <a:t>12/16/2017</a:t>
             </a:fld>
             <a:endParaRPr lang="en-US" dirty="0"/>
           </a:p>
@@ -8350,7 +8351,7 @@
           <a:p>
             <a:fld id="{48A87A34-81AB-432B-8DAE-1953F412C126}" type="datetimeFigureOut">
               <a:rPr lang="en-US" dirty="0"/>
-              <a:t>12/13/2017</a:t>
+              <a:t>12/16/2017</a:t>
             </a:fld>
             <a:endParaRPr lang="en-US" dirty="0"/>
           </a:p>
@@ -8594,7 +8595,7 @@
           <a:p>
             <a:fld id="{48A87A34-81AB-432B-8DAE-1953F412C126}" type="datetimeFigureOut">
               <a:rPr lang="en-US" dirty="0"/>
-              <a:t>12/13/2017</a:t>
+              <a:t>12/16/2017</a:t>
             </a:fld>
             <a:endParaRPr lang="en-US" dirty="0"/>
           </a:p>
@@ -8869,7 +8870,7 @@
           <a:p>
             <a:fld id="{48A87A34-81AB-432B-8DAE-1953F412C126}" type="datetimeFigureOut">
               <a:rPr lang="en-US" dirty="0"/>
-              <a:t>12/13/2017</a:t>
+              <a:t>12/16/2017</a:t>
             </a:fld>
             <a:endParaRPr lang="en-US" dirty="0"/>
           </a:p>
@@ -11942,7 +11943,7 @@
             <a:fld id="{48A87A34-81AB-432B-8DAE-1953F412C126}" type="datetimeFigureOut">
               <a:rPr lang="en-US" dirty="0"/>
               <a:pPr/>
-              <a:t>12/13/2017</a:t>
+              <a:t>12/16/2017</a:t>
             </a:fld>
             <a:endParaRPr lang="en-US" dirty="0"/>
           </a:p>
@@ -12388,7 +12389,11 @@
           <a:p>
             <a:pPr algn="ctr"/>
             <a:r>
-              <a:rPr lang="en-US" dirty="0"/>
+              <a:rPr lang="en-US" dirty="0">
+                <a:solidFill>
+                  <a:schemeClr val="bg1"/>
+                </a:solidFill>
+              </a:rPr>
               <a:t>T.A.N.G.L.E</a:t>
             </a:r>
           </a:p>
@@ -12424,7 +12429,11 @@
           <a:p>
             <a:pPr algn="ctr"/>
             <a:r>
-              <a:rPr lang="en-US" sz="3200" dirty="0"/>
+              <a:rPr lang="en-US" sz="3200" dirty="0">
+                <a:solidFill>
+                  <a:schemeClr val="bg1"/>
+                </a:solidFill>
+              </a:rPr>
               <a:t>That’s A Nice Good Looking Encryption</a:t>
             </a:r>
           </a:p>
@@ -12459,13 +12468,21 @@
           <a:lstStyle/>
           <a:p>
             <a:r>
-              <a:rPr lang="en-US" sz="2400" b="1" dirty="0"/>
+              <a:rPr lang="en-US" sz="2400" b="1" dirty="0">
+                <a:solidFill>
+                  <a:schemeClr val="bg1"/>
+                </a:solidFill>
+              </a:rPr>
               <a:t>Runcy Oommen</a:t>
             </a:r>
           </a:p>
           <a:p>
             <a:r>
-              <a:rPr lang="en-US" sz="2400" b="1" dirty="0"/>
+              <a:rPr lang="en-US" sz="2400" b="1" dirty="0">
+                <a:solidFill>
+                  <a:schemeClr val="bg1"/>
+                </a:solidFill>
+              </a:rPr>
               <a:t>Arun Kumar S</a:t>
             </a:r>
           </a:p>
@@ -12528,7 +12545,11 @@
           <a:lstStyle/>
           <a:p>
             <a:r>
-              <a:rPr lang="en-US" dirty="0"/>
+              <a:rPr lang="en-US" dirty="0">
+                <a:solidFill>
+                  <a:schemeClr val="bg1"/>
+                </a:solidFill>
+              </a:rPr>
               <a:t>Current scenario &amp; threat landscape</a:t>
             </a:r>
           </a:p>
@@ -12563,37 +12584,61 @@
           <a:lstStyle/>
           <a:p>
             <a:r>
-              <a:rPr lang="en-US" dirty="0"/>
+              <a:rPr lang="en-US" dirty="0">
+                <a:solidFill>
+                  <a:schemeClr val="bg1"/>
+                </a:solidFill>
+              </a:rPr>
               <a:t>Method used for encryption is primitive (in tech speak)</a:t>
             </a:r>
           </a:p>
           <a:p>
             <a:r>
-              <a:rPr lang="en-US" dirty="0"/>
+              <a:rPr lang="en-US" dirty="0">
+                <a:solidFill>
+                  <a:schemeClr val="bg1"/>
+                </a:solidFill>
+              </a:rPr>
               <a:t>Data movement to cloud growing at an exponential rate</a:t>
             </a:r>
           </a:p>
           <a:p>
             <a:r>
-              <a:rPr lang="en-US" dirty="0"/>
+              <a:rPr lang="en-US" dirty="0">
+                <a:solidFill>
+                  <a:schemeClr val="bg1"/>
+                </a:solidFill>
+              </a:rPr>
               <a:t>Edward Snowden revelations of mass govt. sponsored data snooping</a:t>
             </a:r>
           </a:p>
           <a:p>
             <a:r>
-              <a:rPr lang="en-US" dirty="0"/>
+              <a:rPr lang="en-US" dirty="0">
+                <a:solidFill>
+                  <a:schemeClr val="bg1"/>
+                </a:solidFill>
+              </a:rPr>
               <a:t>Intentional weakening of algorithms and protocols by vendors</a:t>
             </a:r>
           </a:p>
           <a:p>
             <a:r>
-              <a:rPr lang="en-US" dirty="0"/>
+              <a:rPr lang="en-US" dirty="0">
+                <a:solidFill>
+                  <a:schemeClr val="bg1"/>
+                </a:solidFill>
+              </a:rPr>
               <a:t>Backdoors to appliances and devices</a:t>
             </a:r>
           </a:p>
           <a:p>
             <a:r>
-              <a:rPr lang="en-US" dirty="0"/>
+              <a:rPr lang="en-US" dirty="0">
+                <a:solidFill>
+                  <a:schemeClr val="bg1"/>
+                </a:solidFill>
+              </a:rPr>
               <a:t>NSA, China, N. Korea…</a:t>
             </a:r>
           </a:p>
@@ -12658,7 +12703,11 @@
           <a:lstStyle/>
           <a:p>
             <a:r>
-              <a:rPr lang="en-US" dirty="0"/>
+              <a:rPr lang="en-US" dirty="0">
+                <a:solidFill>
+                  <a:schemeClr val="bg1"/>
+                </a:solidFill>
+              </a:rPr>
               <a:t>Existing Techniques – pros &amp; cons</a:t>
             </a:r>
           </a:p>
@@ -12697,40 +12746,68 @@
               <a:buChar char="Ø"/>
             </a:pPr>
             <a:r>
-              <a:rPr lang="en-US" b="1" dirty="0"/>
+              <a:rPr lang="en-US" b="1" dirty="0">
+                <a:solidFill>
+                  <a:schemeClr val="bg1"/>
+                </a:solidFill>
+              </a:rPr>
               <a:t>Symmetric Encryption</a:t>
             </a:r>
           </a:p>
           <a:p>
             <a:pPr lvl="1"/>
             <a:r>
-              <a:rPr lang="en-US" u="sng" dirty="0"/>
+              <a:rPr lang="en-US" u="sng" dirty="0">
+                <a:solidFill>
+                  <a:schemeClr val="bg1"/>
+                </a:solidFill>
+              </a:rPr>
               <a:t>Pros:</a:t>
             </a:r>
             <a:r>
-              <a:rPr lang="en-US" dirty="0"/>
+              <a:rPr lang="en-US" dirty="0">
+                <a:solidFill>
+                  <a:schemeClr val="bg1"/>
+                </a:solidFill>
+              </a:rPr>
               <a:t> One key for encryption and decryption</a:t>
             </a:r>
           </a:p>
           <a:p>
             <a:pPr lvl="1"/>
             <a:r>
-              <a:rPr lang="en-US" u="sng" dirty="0"/>
+              <a:rPr lang="en-US" u="sng" dirty="0">
+                <a:solidFill>
+                  <a:schemeClr val="bg1"/>
+                </a:solidFill>
+              </a:rPr>
               <a:t>Pros:</a:t>
             </a:r>
             <a:r>
-              <a:rPr lang="en-US" dirty="0"/>
+              <a:rPr lang="en-US" dirty="0">
+                <a:solidFill>
+                  <a:schemeClr val="bg1"/>
+                </a:solidFill>
+              </a:rPr>
               <a:t> Faster and efficient</a:t>
             </a:r>
           </a:p>
           <a:p>
             <a:pPr lvl="1"/>
             <a:r>
-              <a:rPr lang="en-US" u="sng" dirty="0"/>
+              <a:rPr lang="en-US" u="sng" dirty="0">
+                <a:solidFill>
+                  <a:schemeClr val="bg1"/>
+                </a:solidFill>
+              </a:rPr>
               <a:t>Cons:</a:t>
             </a:r>
             <a:r>
-              <a:rPr lang="en-US" dirty="0"/>
+              <a:rPr lang="en-US" dirty="0">
+                <a:solidFill>
+                  <a:schemeClr val="bg1"/>
+                </a:solidFill>
+              </a:rPr>
               <a:t> Secure channel to exchange key</a:t>
             </a:r>
           </a:p>
@@ -12740,40 +12817,68 @@
               <a:buChar char="Ø"/>
             </a:pPr>
             <a:r>
-              <a:rPr lang="en-US" b="1" dirty="0"/>
+              <a:rPr lang="en-US" b="1" dirty="0">
+                <a:solidFill>
+                  <a:schemeClr val="bg1"/>
+                </a:solidFill>
+              </a:rPr>
               <a:t>Asymmetric Encryption</a:t>
             </a:r>
           </a:p>
           <a:p>
             <a:pPr lvl="1"/>
             <a:r>
-              <a:rPr lang="en-US" u="sng" dirty="0"/>
+              <a:rPr lang="en-US" u="sng" dirty="0">
+                <a:solidFill>
+                  <a:schemeClr val="bg1"/>
+                </a:solidFill>
+              </a:rPr>
               <a:t>Pros:</a:t>
             </a:r>
             <a:r>
-              <a:rPr lang="en-US" dirty="0"/>
+              <a:rPr lang="en-US" dirty="0">
+                <a:solidFill>
+                  <a:schemeClr val="bg1"/>
+                </a:solidFill>
+              </a:rPr>
               <a:t> Concept of private and public key</a:t>
             </a:r>
           </a:p>
           <a:p>
             <a:pPr lvl="1"/>
             <a:r>
-              <a:rPr lang="en-US" u="sng" dirty="0"/>
+              <a:rPr lang="en-US" u="sng" dirty="0">
+                <a:solidFill>
+                  <a:schemeClr val="bg1"/>
+                </a:solidFill>
+              </a:rPr>
               <a:t>Pros:</a:t>
             </a:r>
             <a:r>
-              <a:rPr lang="en-US" dirty="0"/>
+              <a:rPr lang="en-US" dirty="0">
+                <a:solidFill>
+                  <a:schemeClr val="bg1"/>
+                </a:solidFill>
+              </a:rPr>
               <a:t> Convenient and allows non-repudiation</a:t>
             </a:r>
           </a:p>
           <a:p>
             <a:pPr lvl="1"/>
             <a:r>
-              <a:rPr lang="en-US" u="sng" dirty="0"/>
+              <a:rPr lang="en-US" u="sng" dirty="0">
+                <a:solidFill>
+                  <a:schemeClr val="bg1"/>
+                </a:solidFill>
+              </a:rPr>
               <a:t>Cons:</a:t>
             </a:r>
             <a:r>
-              <a:rPr lang="en-US" dirty="0"/>
+              <a:rPr lang="en-US" dirty="0">
+                <a:solidFill>
+                  <a:schemeClr val="bg1"/>
+                </a:solidFill>
+              </a:rPr>
               <a:t> Slow process.</a:t>
             </a:r>
           </a:p>
@@ -12838,7 +12943,11 @@
           <a:lstStyle/>
           <a:p>
             <a:r>
-              <a:rPr lang="en-US" dirty="0"/>
+              <a:rPr lang="en-US" dirty="0">
+                <a:solidFill>
+                  <a:schemeClr val="bg1"/>
+                </a:solidFill>
+              </a:rPr>
               <a:t>Introducing t.a.n.g.l.E</a:t>
             </a:r>
           </a:p>
@@ -12873,31 +12982,51 @@
           <a:lstStyle/>
           <a:p>
             <a:r>
-              <a:rPr lang="en-US" dirty="0"/>
+              <a:rPr lang="en-US" dirty="0">
+                <a:solidFill>
+                  <a:schemeClr val="bg1"/>
+                </a:solidFill>
+              </a:rPr>
               <a:t>Time Dependent - the code used for any character differs depending on time (Linux Epoch).</a:t>
             </a:r>
           </a:p>
           <a:p>
             <a:r>
-              <a:rPr lang="en-US" dirty="0"/>
+              <a:rPr lang="en-US" dirty="0">
+                <a:solidFill>
+                  <a:schemeClr val="bg1"/>
+                </a:solidFill>
+              </a:rPr>
               <a:t>Multi Alphabetic - the same character set at different locations of the plain-text are different.</a:t>
             </a:r>
           </a:p>
           <a:p>
             <a:r>
-              <a:rPr lang="en-US" dirty="0"/>
+              <a:rPr lang="en-US" dirty="0">
+                <a:solidFill>
+                  <a:schemeClr val="bg1"/>
+                </a:solidFill>
+              </a:rPr>
               <a:t>Random number generation technique for code generation.</a:t>
             </a:r>
           </a:p>
           <a:p>
             <a:r>
-              <a:rPr lang="en-US" dirty="0"/>
+              <a:rPr lang="en-US" dirty="0">
+                <a:solidFill>
+                  <a:schemeClr val="bg1"/>
+                </a:solidFill>
+              </a:rPr>
               <a:t>Symmetric key method and uses less complex mathematical operations.</a:t>
             </a:r>
           </a:p>
           <a:p>
             <a:r>
-              <a:rPr lang="en-US" dirty="0"/>
+              <a:rPr lang="en-US" dirty="0">
+                <a:solidFill>
+                  <a:schemeClr val="bg1"/>
+                </a:solidFill>
+              </a:rPr>
               <a:t>Completely customizable by tweaking the algorithm ensuring uniqueness.</a:t>
             </a:r>
           </a:p>
@@ -12962,7 +13091,11 @@
           <a:lstStyle/>
           <a:p>
             <a:r>
-              <a:rPr lang="en-US" dirty="0"/>
+              <a:rPr lang="en-US" dirty="0">
+                <a:solidFill>
+                  <a:schemeClr val="bg1"/>
+                </a:solidFill>
+              </a:rPr>
               <a:t>Encryption process</a:t>
             </a:r>
           </a:p>
@@ -13001,7 +13134,11 @@
               <a:buAutoNum type="arabicPeriod"/>
             </a:pPr>
             <a:r>
-              <a:rPr lang="en-US" dirty="0"/>
+              <a:rPr lang="en-US" dirty="0">
+                <a:solidFill>
+                  <a:schemeClr val="bg1"/>
+                </a:solidFill>
+              </a:rPr>
               <a:t>Get Linux epoch and generate a random 4 digit number</a:t>
             </a:r>
           </a:p>
@@ -13011,7 +13148,11 @@
               <a:buAutoNum type="arabicPeriod"/>
             </a:pPr>
             <a:r>
-              <a:rPr lang="en-US" dirty="0"/>
+              <a:rPr lang="en-US" dirty="0">
+                <a:solidFill>
+                  <a:schemeClr val="bg1"/>
+                </a:solidFill>
+              </a:rPr>
               <a:t>Multiply them together to get a product that will be exchanged b/w clients</a:t>
             </a:r>
           </a:p>
@@ -13021,7 +13162,11 @@
               <a:buAutoNum type="arabicPeriod"/>
             </a:pPr>
             <a:r>
-              <a:rPr lang="en-US" dirty="0"/>
+              <a:rPr lang="en-US" dirty="0">
+                <a:solidFill>
+                  <a:schemeClr val="bg1"/>
+                </a:solidFill>
+              </a:rPr>
               <a:t>Select random 8 digits or more from this product</a:t>
             </a:r>
           </a:p>
@@ -13031,7 +13176,11 @@
               <a:buAutoNum type="arabicPeriod"/>
             </a:pPr>
             <a:r>
-              <a:rPr lang="en-US" dirty="0"/>
+              <a:rPr lang="en-US" dirty="0">
+                <a:solidFill>
+                  <a:schemeClr val="bg1"/>
+                </a:solidFill>
+              </a:rPr>
               <a:t>Set appropriate buffer size for encoding, say 150</a:t>
             </a:r>
           </a:p>
@@ -13041,21 +13190,26 @@
               <a:buAutoNum type="arabicPeriod"/>
             </a:pPr>
             <a:r>
-              <a:rPr lang="en-US" dirty="0"/>
-              <a:t>Generate the next 150 prime numbers with seed from step #3, to be modulo-d with 127</a:t>
+              <a:rPr lang="en-US" dirty="0">
+                <a:solidFill>
+                  <a:schemeClr val="bg1"/>
+                </a:solidFill>
+              </a:rPr>
+              <a:t>Generate the next 150 prime numbers with seed from step #3, modulo-d with 127</a:t>
             </a:r>
             <a:r>
               <a:rPr lang="en-US" b="1" dirty="0">
                 <a:solidFill>
-                  <a:srgbClr val="FF0000"/>
+                  <a:schemeClr val="bg1"/>
                 </a:solidFill>
               </a:rPr>
               <a:t>*</a:t>
             </a:r>
-            <a:r>
-              <a:rPr lang="en-US" dirty="0"/>
-              <a:t> to get values from 0 to 126</a:t>
-            </a:r>
+            <a:endParaRPr lang="en-US" dirty="0">
+              <a:solidFill>
+                <a:schemeClr val="bg1"/>
+              </a:solidFill>
+            </a:endParaRPr>
           </a:p>
           <a:p>
             <a:pPr marL="457200" lvl="0" indent="-457200">
@@ -13063,7 +13217,11 @@
               <a:buAutoNum type="arabicPeriod"/>
             </a:pPr>
             <a:r>
-              <a:rPr lang="en-US" dirty="0"/>
+              <a:rPr lang="en-US" dirty="0">
+                <a:solidFill>
+                  <a:schemeClr val="bg1"/>
+                </a:solidFill>
+              </a:rPr>
               <a:t>Generate ASCII value series based on each of this modulo value as the start</a:t>
             </a:r>
           </a:p>
@@ -13073,7 +13231,11 @@
               <a:buAutoNum type="arabicPeriod"/>
             </a:pPr>
             <a:r>
-              <a:rPr lang="en-US" dirty="0"/>
+              <a:rPr lang="en-US" dirty="0">
+                <a:solidFill>
+                  <a:schemeClr val="bg1"/>
+                </a:solidFill>
+              </a:rPr>
               <a:t>Start substituting the plain-text characters from the series which we arrived at step #6 to form the encrypted text</a:t>
             </a:r>
           </a:p>
@@ -13093,8 +13255,8 @@
         </p:nvSpPr>
         <p:spPr>
           <a:xfrm>
-            <a:off x="8759689" y="6294784"/>
-            <a:ext cx="3048000" cy="371061"/>
+            <a:off x="8269357" y="6294784"/>
+            <a:ext cx="3538332" cy="369332"/>
           </a:xfrm>
           <a:prstGeom prst="rect">
             <a:avLst/>
@@ -13117,7 +13279,7 @@
             </a:r>
             <a:r>
               <a:rPr lang="en-US" dirty="0"/>
-              <a:t>127 ASCII codes for demo</a:t>
+              <a:t>Up to 127 ASCII codes for demo</a:t>
             </a:r>
           </a:p>
         </p:txBody>
@@ -13154,10 +13316,10 @@
       </p:grpSpPr>
       <p:sp>
         <p:nvSpPr>
-          <p:cNvPr id="2" name="Title 1">
+          <p:cNvPr id="6" name="Title 1">
             <a:extLst>
               <a:ext uri="{FF2B5EF4-FFF2-40B4-BE49-F238E27FC236}">
-                <a16:creationId xmlns:a16="http://schemas.microsoft.com/office/drawing/2014/main" id="{02AD11CD-5CE1-4C35-9980-3294E1E6C7C8}"/>
+                <a16:creationId xmlns:a16="http://schemas.microsoft.com/office/drawing/2014/main" id="{4245A71F-99F3-4929-BEE5-E006F11E108A}"/>
               </a:ext>
             </a:extLst>
           </p:cNvPr>
@@ -13170,8 +13332,8 @@
         </p:nvSpPr>
         <p:spPr>
           <a:xfrm>
-            <a:off x="1141412" y="393226"/>
-            <a:ext cx="4702797" cy="1024752"/>
+            <a:off x="969132" y="525747"/>
+            <a:ext cx="4769058" cy="1024752"/>
           </a:xfrm>
         </p:spPr>
         <p:txBody>
@@ -13181,75 +13343,50 @@
           <a:lstStyle/>
           <a:p>
             <a:r>
-              <a:rPr lang="en-US" dirty="0"/>
-              <a:t>decryption process</a:t>
+              <a:rPr lang="en-US" dirty="0">
+                <a:solidFill>
+                  <a:schemeClr val="bg1"/>
+                </a:solidFill>
+              </a:rPr>
+              <a:t>Sample encryption</a:t>
             </a:r>
           </a:p>
         </p:txBody>
       </p:sp>
-      <p:sp>
-        <p:nvSpPr>
-          <p:cNvPr id="6" name="Content Placeholder 2">
+      <p:pic>
+        <p:nvPicPr>
+          <p:cNvPr id="3" name="Picture 2">
             <a:extLst>
               <a:ext uri="{FF2B5EF4-FFF2-40B4-BE49-F238E27FC236}">
-                <a16:creationId xmlns:a16="http://schemas.microsoft.com/office/drawing/2014/main" id="{4904B997-10E2-421F-9BB4-E76509BF4329}"/>
+                <a16:creationId xmlns:a16="http://schemas.microsoft.com/office/drawing/2014/main" id="{00DEBF2D-96B3-44F4-BA76-ADCF2C31AF2C}"/>
               </a:ext>
             </a:extLst>
           </p:cNvPr>
-          <p:cNvSpPr>
-            <a:spLocks noGrp="1"/>
-          </p:cNvSpPr>
-          <p:nvPr>
-            <p:ph idx="1"/>
-          </p:nvPr>
-        </p:nvSpPr>
+          <p:cNvPicPr>
+            <a:picLocks noChangeAspect="1"/>
+          </p:cNvPicPr>
+          <p:nvPr/>
+        </p:nvPicPr>
+        <p:blipFill>
+          <a:blip r:embed="rId2"/>
+          <a:stretch>
+            <a:fillRect/>
+          </a:stretch>
+        </p:blipFill>
         <p:spPr>
           <a:xfrm>
-            <a:off x="980662" y="1828799"/>
-            <a:ext cx="10363200" cy="2875723"/>
+            <a:off x="969132" y="1705467"/>
+            <a:ext cx="9295778" cy="3447066"/>
           </a:xfrm>
+          <a:prstGeom prst="rect">
+            <a:avLst/>
+          </a:prstGeom>
         </p:spPr>
-        <p:txBody>
-          <a:bodyPr>
-            <a:normAutofit lnSpcReduction="10000"/>
-          </a:bodyPr>
-          <a:lstStyle/>
-          <a:p>
-            <a:pPr marL="457200" lvl="0" indent="-457200">
-              <a:buFont typeface="+mj-lt"/>
-              <a:buAutoNum type="arabicPeriod"/>
-            </a:pPr>
-            <a:r>
-              <a:rPr lang="en-US" dirty="0"/>
-              <a:t>Based on the initial product exchanged, get the required key by following the same process as in encryption</a:t>
-            </a:r>
-          </a:p>
-          <a:p>
-            <a:pPr marL="457200" lvl="0" indent="-457200">
-              <a:buFont typeface="+mj-lt"/>
-              <a:buAutoNum type="arabicPeriod"/>
-            </a:pPr>
-            <a:r>
-              <a:rPr lang="en-US" dirty="0"/>
-              <a:t>Have the series generated accordingly based on the modulo value as the starting point</a:t>
-            </a:r>
-          </a:p>
-          <a:p>
-            <a:pPr marL="457200" lvl="0" indent="-457200">
-              <a:buFont typeface="+mj-lt"/>
-              <a:buAutoNum type="arabicPeriod"/>
-            </a:pPr>
-            <a:r>
-              <a:rPr lang="en-US" dirty="0"/>
-              <a:t>Perform a reverse lookup on the series with the encrypted value to get the real value</a:t>
-            </a:r>
-          </a:p>
-        </p:txBody>
-      </p:sp>
+      </p:pic>
     </p:spTree>
     <p:extLst>
       <p:ext uri="{BB962C8B-B14F-4D97-AF65-F5344CB8AC3E}">
-        <p14:creationId xmlns:p14="http://schemas.microsoft.com/office/powerpoint/2010/main" val="3416805787"/>
+        <p14:creationId xmlns:p14="http://schemas.microsoft.com/office/powerpoint/2010/main" val="4261583865"/>
       </p:ext>
     </p:extLst>
   </p:cSld>
@@ -13294,6 +13431,146 @@
         </p:nvSpPr>
         <p:spPr>
           <a:xfrm>
+            <a:off x="1141412" y="393226"/>
+            <a:ext cx="4702797" cy="1024752"/>
+          </a:xfrm>
+        </p:spPr>
+        <p:txBody>
+          <a:bodyPr>
+            <a:normAutofit/>
+          </a:bodyPr>
+          <a:lstStyle/>
+          <a:p>
+            <a:r>
+              <a:rPr lang="en-US" dirty="0">
+                <a:solidFill>
+                  <a:schemeClr val="bg1"/>
+                </a:solidFill>
+              </a:rPr>
+              <a:t>decryption process</a:t>
+            </a:r>
+          </a:p>
+        </p:txBody>
+      </p:sp>
+      <p:sp>
+        <p:nvSpPr>
+          <p:cNvPr id="6" name="Content Placeholder 2">
+            <a:extLst>
+              <a:ext uri="{FF2B5EF4-FFF2-40B4-BE49-F238E27FC236}">
+                <a16:creationId xmlns:a16="http://schemas.microsoft.com/office/drawing/2014/main" id="{4904B997-10E2-421F-9BB4-E76509BF4329}"/>
+              </a:ext>
+            </a:extLst>
+          </p:cNvPr>
+          <p:cNvSpPr>
+            <a:spLocks noGrp="1"/>
+          </p:cNvSpPr>
+          <p:nvPr>
+            <p:ph idx="1"/>
+          </p:nvPr>
+        </p:nvSpPr>
+        <p:spPr>
+          <a:xfrm>
+            <a:off x="980662" y="1828799"/>
+            <a:ext cx="10363200" cy="2875723"/>
+          </a:xfrm>
+        </p:spPr>
+        <p:txBody>
+          <a:bodyPr>
+            <a:normAutofit lnSpcReduction="10000"/>
+          </a:bodyPr>
+          <a:lstStyle/>
+          <a:p>
+            <a:pPr marL="457200" lvl="0" indent="-457200">
+              <a:buFont typeface="+mj-lt"/>
+              <a:buAutoNum type="arabicPeriod"/>
+            </a:pPr>
+            <a:r>
+              <a:rPr lang="en-US" dirty="0">
+                <a:solidFill>
+                  <a:schemeClr val="bg1"/>
+                </a:solidFill>
+              </a:rPr>
+              <a:t>Based on the initial product exchanged, get the required key by following the same process as in encryption</a:t>
+            </a:r>
+          </a:p>
+          <a:p>
+            <a:pPr marL="457200" lvl="0" indent="-457200">
+              <a:buFont typeface="+mj-lt"/>
+              <a:buAutoNum type="arabicPeriod"/>
+            </a:pPr>
+            <a:r>
+              <a:rPr lang="en-US" dirty="0">
+                <a:solidFill>
+                  <a:schemeClr val="bg1"/>
+                </a:solidFill>
+              </a:rPr>
+              <a:t>Have the series generated accordingly based on the modulo value as the starting point</a:t>
+            </a:r>
+          </a:p>
+          <a:p>
+            <a:pPr marL="457200" lvl="0" indent="-457200">
+              <a:buFont typeface="+mj-lt"/>
+              <a:buAutoNum type="arabicPeriod"/>
+            </a:pPr>
+            <a:r>
+              <a:rPr lang="en-US" dirty="0">
+                <a:solidFill>
+                  <a:schemeClr val="bg1"/>
+                </a:solidFill>
+              </a:rPr>
+              <a:t>Perform a reverse lookup on the series with the encrypted value to get the real value</a:t>
+            </a:r>
+          </a:p>
+        </p:txBody>
+      </p:sp>
+    </p:spTree>
+    <p:extLst>
+      <p:ext uri="{BB962C8B-B14F-4D97-AF65-F5344CB8AC3E}">
+        <p14:creationId xmlns:p14="http://schemas.microsoft.com/office/powerpoint/2010/main" val="3416805787"/>
+      </p:ext>
+    </p:extLst>
+  </p:cSld>
+  <p:clrMapOvr>
+    <a:masterClrMapping/>
+  </p:clrMapOvr>
+</p:sld>
+</file>
+
+<file path=ppt/slides/slide8.xml><?xml version="1.0" encoding="utf-8"?>
+<p:sld xmlns:a="http://schemas.openxmlformats.org/drawingml/2006/main" xmlns:r="http://schemas.openxmlformats.org/officeDocument/2006/relationships" xmlns:p="http://schemas.openxmlformats.org/presentationml/2006/main">
+  <p:cSld>
+    <p:spTree>
+      <p:nvGrpSpPr>
+        <p:cNvPr id="1" name=""/>
+        <p:cNvGrpSpPr/>
+        <p:nvPr/>
+      </p:nvGrpSpPr>
+      <p:grpSpPr>
+        <a:xfrm>
+          <a:off x="0" y="0"/>
+          <a:ext cx="0" cy="0"/>
+          <a:chOff x="0" y="0"/>
+          <a:chExt cx="0" cy="0"/>
+        </a:xfrm>
+      </p:grpSpPr>
+      <p:sp>
+        <p:nvSpPr>
+          <p:cNvPr id="2" name="Title 1">
+            <a:extLst>
+              <a:ext uri="{FF2B5EF4-FFF2-40B4-BE49-F238E27FC236}">
+                <a16:creationId xmlns:a16="http://schemas.microsoft.com/office/drawing/2014/main" id="{02AD11CD-5CE1-4C35-9980-3294E1E6C7C8}"/>
+              </a:ext>
+            </a:extLst>
+          </p:cNvPr>
+          <p:cNvSpPr>
+            <a:spLocks noGrp="1"/>
+          </p:cNvSpPr>
+          <p:nvPr>
+            <p:ph type="title"/>
+          </p:nvPr>
+        </p:nvSpPr>
+        <p:spPr>
+          <a:xfrm>
             <a:off x="5314985" y="2497014"/>
             <a:ext cx="1549642" cy="1024752"/>
           </a:xfrm>
@@ -13305,7 +13582,11 @@
           <a:lstStyle/>
           <a:p>
             <a:r>
-              <a:rPr lang="en-US" dirty="0"/>
+              <a:rPr lang="en-US" dirty="0">
+                <a:solidFill>
+                  <a:schemeClr val="bg1"/>
+                </a:solidFill>
+              </a:rPr>
               <a:t>DEMO</a:t>
             </a:r>
           </a:p>

</xml_diff>

<commit_message>
Update demo url in ppt
</commit_message>
<xml_diff>
--- a/ppt/TANGLE.pptx
+++ b/ppt/TANGLE.pptx
@@ -173,7 +173,7 @@
           <a:noFill/>
           <a:extLst>
             <a:ext uri="{909E8E84-426E-40dd-AFC4-6F175D3DCCD1}">
-              <a14:hiddenFill xmlns:a14="http://schemas.microsoft.com/office/drawing/2010/main" xmlns="">
+              <a14:hiddenFill xmlns="" xmlns:a14="http://schemas.microsoft.com/office/drawing/2010/main">
                 <a:solidFill>
                   <a:srgbClr val="FFFFFF"/>
                 </a:solidFill>
@@ -233,7 +233,7 @@
             </a:ln>
             <a:extLst>
               <a:ext uri="{91240B29-F687-4f45-9708-019B960494DF}">
-                <a14:hiddenLine xmlns:a14="http://schemas.microsoft.com/office/drawing/2010/main" xmlns="" w="9525">
+                <a14:hiddenLine xmlns="" xmlns:a14="http://schemas.microsoft.com/office/drawing/2010/main" w="9525">
                   <a:solidFill>
                     <a:srgbClr val="000000"/>
                   </a:solidFill>
@@ -323,7 +323,7 @@
             </a:ln>
             <a:extLst>
               <a:ext uri="{91240B29-F687-4f45-9708-019B960494DF}">
-                <a14:hiddenLine xmlns:a14="http://schemas.microsoft.com/office/drawing/2010/main" xmlns="" w="9525">
+                <a14:hiddenLine xmlns="" xmlns:a14="http://schemas.microsoft.com/office/drawing/2010/main" w="9525">
                   <a:solidFill>
                     <a:srgbClr val="000000"/>
                   </a:solidFill>
@@ -413,7 +413,7 @@
             </a:ln>
             <a:extLst>
               <a:ext uri="{91240B29-F687-4f45-9708-019B960494DF}">
-                <a14:hiddenLine xmlns:a14="http://schemas.microsoft.com/office/drawing/2010/main" xmlns="" w="9525">
+                <a14:hiddenLine xmlns="" xmlns:a14="http://schemas.microsoft.com/office/drawing/2010/main" w="9525">
                   <a:solidFill>
                     <a:srgbClr val="000000"/>
                   </a:solidFill>
@@ -447,7 +447,7 @@
             </a:ln>
             <a:extLst>
               <a:ext uri="{91240B29-F687-4f45-9708-019B960494DF}">
-                <a14:hiddenLine xmlns:a14="http://schemas.microsoft.com/office/drawing/2010/main" xmlns="" w="9525">
+                <a14:hiddenLine xmlns="" xmlns:a14="http://schemas.microsoft.com/office/drawing/2010/main" w="9525">
                   <a:solidFill>
                     <a:srgbClr val="000000"/>
                   </a:solidFill>
@@ -537,7 +537,7 @@
             </a:ln>
             <a:extLst>
               <a:ext uri="{91240B29-F687-4f45-9708-019B960494DF}">
-                <a14:hiddenLine xmlns:a14="http://schemas.microsoft.com/office/drawing/2010/main" xmlns="" w="9525">
+                <a14:hiddenLine xmlns="" xmlns:a14="http://schemas.microsoft.com/office/drawing/2010/main" w="9525">
                   <a:solidFill>
                     <a:srgbClr val="000000"/>
                   </a:solidFill>
@@ -599,7 +599,7 @@
             </a:ln>
             <a:extLst>
               <a:ext uri="{91240B29-F687-4f45-9708-019B960494DF}">
-                <a14:hiddenLine xmlns:a14="http://schemas.microsoft.com/office/drawing/2010/main" xmlns="" w="9525">
+                <a14:hiddenLine xmlns="" xmlns:a14="http://schemas.microsoft.com/office/drawing/2010/main" w="9525">
                   <a:solidFill>
                     <a:srgbClr val="000000"/>
                   </a:solidFill>
@@ -661,7 +661,7 @@
             </a:ln>
             <a:extLst>
               <a:ext uri="{91240B29-F687-4f45-9708-019B960494DF}">
-                <a14:hiddenLine xmlns:a14="http://schemas.microsoft.com/office/drawing/2010/main" xmlns="" w="9525">
+                <a14:hiddenLine xmlns="" xmlns:a14="http://schemas.microsoft.com/office/drawing/2010/main" w="9525">
                   <a:solidFill>
                     <a:srgbClr val="000000"/>
                   </a:solidFill>
@@ -751,7 +751,7 @@
             </a:ln>
             <a:extLst>
               <a:ext uri="{91240B29-F687-4f45-9708-019B960494DF}">
-                <a14:hiddenLine xmlns:a14="http://schemas.microsoft.com/office/drawing/2010/main" xmlns="" w="9525">
+                <a14:hiddenLine xmlns="" xmlns:a14="http://schemas.microsoft.com/office/drawing/2010/main" w="9525">
                   <a:solidFill>
                     <a:srgbClr val="000000"/>
                   </a:solidFill>
@@ -813,7 +813,7 @@
             </a:ln>
             <a:extLst>
               <a:ext uri="{91240B29-F687-4f45-9708-019B960494DF}">
-                <a14:hiddenLine xmlns:a14="http://schemas.microsoft.com/office/drawing/2010/main" xmlns="" w="9525">
+                <a14:hiddenLine xmlns="" xmlns:a14="http://schemas.microsoft.com/office/drawing/2010/main" w="9525">
                   <a:solidFill>
                     <a:srgbClr val="000000"/>
                   </a:solidFill>
@@ -875,7 +875,7 @@
             </a:ln>
             <a:extLst>
               <a:ext uri="{91240B29-F687-4f45-9708-019B960494DF}">
-                <a14:hiddenLine xmlns:a14="http://schemas.microsoft.com/office/drawing/2010/main" xmlns="" w="9525">
+                <a14:hiddenLine xmlns="" xmlns:a14="http://schemas.microsoft.com/office/drawing/2010/main" w="9525">
                   <a:solidFill>
                     <a:srgbClr val="000000"/>
                   </a:solidFill>
@@ -965,7 +965,7 @@
             </a:ln>
             <a:extLst>
               <a:ext uri="{91240B29-F687-4f45-9708-019B960494DF}">
-                <a14:hiddenLine xmlns:a14="http://schemas.microsoft.com/office/drawing/2010/main" xmlns="" w="9525">
+                <a14:hiddenLine xmlns="" xmlns:a14="http://schemas.microsoft.com/office/drawing/2010/main" w="9525">
                   <a:solidFill>
                     <a:srgbClr val="000000"/>
                   </a:solidFill>
@@ -1055,7 +1055,7 @@
             </a:ln>
             <a:extLst>
               <a:ext uri="{91240B29-F687-4f45-9708-019B960494DF}">
-                <a14:hiddenLine xmlns:a14="http://schemas.microsoft.com/office/drawing/2010/main" xmlns="" w="9525">
+                <a14:hiddenLine xmlns="" xmlns:a14="http://schemas.microsoft.com/office/drawing/2010/main" w="9525">
                   <a:solidFill>
                     <a:srgbClr val="000000"/>
                   </a:solidFill>
@@ -1117,7 +1117,7 @@
             </a:ln>
             <a:extLst>
               <a:ext uri="{91240B29-F687-4f45-9708-019B960494DF}">
-                <a14:hiddenLine xmlns:a14="http://schemas.microsoft.com/office/drawing/2010/main" xmlns="" w="9525">
+                <a14:hiddenLine xmlns="" xmlns:a14="http://schemas.microsoft.com/office/drawing/2010/main" w="9525">
                   <a:solidFill>
                     <a:srgbClr val="000000"/>
                   </a:solidFill>
@@ -1227,7 +1227,7 @@
             </a:ln>
             <a:extLst>
               <a:ext uri="{91240B29-F687-4f45-9708-019B960494DF}">
-                <a14:hiddenLine xmlns:a14="http://schemas.microsoft.com/office/drawing/2010/main" xmlns="" w="9525">
+                <a14:hiddenLine xmlns="" xmlns:a14="http://schemas.microsoft.com/office/drawing/2010/main" w="9525">
                   <a:solidFill>
                     <a:srgbClr val="000000"/>
                   </a:solidFill>
@@ -1289,7 +1289,7 @@
             </a:ln>
             <a:extLst>
               <a:ext uri="{91240B29-F687-4f45-9708-019B960494DF}">
-                <a14:hiddenLine xmlns:a14="http://schemas.microsoft.com/office/drawing/2010/main" xmlns="" w="9525">
+                <a14:hiddenLine xmlns="" xmlns:a14="http://schemas.microsoft.com/office/drawing/2010/main" w="9525">
                   <a:solidFill>
                     <a:srgbClr val="000000"/>
                   </a:solidFill>
@@ -1379,7 +1379,7 @@
             </a:ln>
             <a:extLst>
               <a:ext uri="{91240B29-F687-4f45-9708-019B960494DF}">
-                <a14:hiddenLine xmlns:a14="http://schemas.microsoft.com/office/drawing/2010/main" xmlns="" w="9525">
+                <a14:hiddenLine xmlns="" xmlns:a14="http://schemas.microsoft.com/office/drawing/2010/main" w="9525">
                   <a:solidFill>
                     <a:srgbClr val="000000"/>
                   </a:solidFill>
@@ -1469,7 +1469,7 @@
             </a:ln>
             <a:extLst>
               <a:ext uri="{91240B29-F687-4f45-9708-019B960494DF}">
-                <a14:hiddenLine xmlns:a14="http://schemas.microsoft.com/office/drawing/2010/main" xmlns="" w="9525">
+                <a14:hiddenLine xmlns="" xmlns:a14="http://schemas.microsoft.com/office/drawing/2010/main" w="9525">
                   <a:solidFill>
                     <a:srgbClr val="000000"/>
                   </a:solidFill>
@@ -1531,7 +1531,7 @@
             </a:ln>
             <a:extLst>
               <a:ext uri="{91240B29-F687-4f45-9708-019B960494DF}">
-                <a14:hiddenLine xmlns:a14="http://schemas.microsoft.com/office/drawing/2010/main" xmlns="" w="9525">
+                <a14:hiddenLine xmlns="" xmlns:a14="http://schemas.microsoft.com/office/drawing/2010/main" w="9525">
                   <a:solidFill>
                     <a:srgbClr val="000000"/>
                   </a:solidFill>
@@ -1621,7 +1621,7 @@
             </a:ln>
             <a:extLst>
               <a:ext uri="{91240B29-F687-4f45-9708-019B960494DF}">
-                <a14:hiddenLine xmlns:a14="http://schemas.microsoft.com/office/drawing/2010/main" xmlns="" w="9525">
+                <a14:hiddenLine xmlns="" xmlns:a14="http://schemas.microsoft.com/office/drawing/2010/main" w="9525">
                   <a:solidFill>
                     <a:srgbClr val="000000"/>
                   </a:solidFill>
@@ -1711,7 +1711,7 @@
             </a:ln>
             <a:extLst>
               <a:ext uri="{91240B29-F687-4f45-9708-019B960494DF}">
-                <a14:hiddenLine xmlns:a14="http://schemas.microsoft.com/office/drawing/2010/main" xmlns="" w="9525">
+                <a14:hiddenLine xmlns="" xmlns:a14="http://schemas.microsoft.com/office/drawing/2010/main" w="9525">
                   <a:solidFill>
                     <a:srgbClr val="000000"/>
                   </a:solidFill>
@@ -1767,7 +1767,7 @@
             </a:ln>
             <a:extLst>
               <a:ext uri="{91240B29-F687-4f45-9708-019B960494DF}">
-                <a14:hiddenLine xmlns:a14="http://schemas.microsoft.com/office/drawing/2010/main" xmlns="" w="9525">
+                <a14:hiddenLine xmlns="" xmlns:a14="http://schemas.microsoft.com/office/drawing/2010/main" w="9525">
                   <a:solidFill>
                     <a:srgbClr val="000000"/>
                   </a:solidFill>
@@ -1857,7 +1857,7 @@
             </a:ln>
             <a:extLst>
               <a:ext uri="{91240B29-F687-4f45-9708-019B960494DF}">
-                <a14:hiddenLine xmlns:a14="http://schemas.microsoft.com/office/drawing/2010/main" xmlns="" w="9525">
+                <a14:hiddenLine xmlns="" xmlns:a14="http://schemas.microsoft.com/office/drawing/2010/main" w="9525">
                   <a:solidFill>
                     <a:srgbClr val="000000"/>
                   </a:solidFill>
@@ -1913,7 +1913,7 @@
             </a:ln>
             <a:extLst>
               <a:ext uri="{91240B29-F687-4f45-9708-019B960494DF}">
-                <a14:hiddenLine xmlns:a14="http://schemas.microsoft.com/office/drawing/2010/main" xmlns="" w="9525">
+                <a14:hiddenLine xmlns="" xmlns:a14="http://schemas.microsoft.com/office/drawing/2010/main" w="9525">
                   <a:solidFill>
                     <a:srgbClr val="000000"/>
                   </a:solidFill>
@@ -2003,7 +2003,7 @@
             </a:ln>
             <a:extLst>
               <a:ext uri="{91240B29-F687-4f45-9708-019B960494DF}">
-                <a14:hiddenLine xmlns:a14="http://schemas.microsoft.com/office/drawing/2010/main" xmlns="" w="9525">
+                <a14:hiddenLine xmlns="" xmlns:a14="http://schemas.microsoft.com/office/drawing/2010/main" w="9525">
                   <a:solidFill>
                     <a:srgbClr val="000000"/>
                   </a:solidFill>
@@ -2071,7 +2071,7 @@
             </a:ln>
             <a:extLst>
               <a:ext uri="{91240B29-F687-4f45-9708-019B960494DF}">
-                <a14:hiddenLine xmlns:a14="http://schemas.microsoft.com/office/drawing/2010/main" xmlns="" w="9525">
+                <a14:hiddenLine xmlns="" xmlns:a14="http://schemas.microsoft.com/office/drawing/2010/main" w="9525">
                   <a:solidFill>
                     <a:srgbClr val="000000"/>
                   </a:solidFill>
@@ -2161,7 +2161,7 @@
             </a:ln>
             <a:extLst>
               <a:ext uri="{91240B29-F687-4f45-9708-019B960494DF}">
-                <a14:hiddenLine xmlns:a14="http://schemas.microsoft.com/office/drawing/2010/main" xmlns="" w="9525">
+                <a14:hiddenLine xmlns="" xmlns:a14="http://schemas.microsoft.com/office/drawing/2010/main" w="9525">
                   <a:solidFill>
                     <a:srgbClr val="000000"/>
                   </a:solidFill>
@@ -2229,7 +2229,7 @@
             </a:ln>
             <a:extLst>
               <a:ext uri="{91240B29-F687-4f45-9708-019B960494DF}">
-                <a14:hiddenLine xmlns:a14="http://schemas.microsoft.com/office/drawing/2010/main" xmlns="" w="9525">
+                <a14:hiddenLine xmlns="" xmlns:a14="http://schemas.microsoft.com/office/drawing/2010/main" w="9525">
                   <a:solidFill>
                     <a:srgbClr val="000000"/>
                   </a:solidFill>
@@ -2319,7 +2319,7 @@
             </a:ln>
             <a:extLst>
               <a:ext uri="{91240B29-F687-4f45-9708-019B960494DF}">
-                <a14:hiddenLine xmlns:a14="http://schemas.microsoft.com/office/drawing/2010/main" xmlns="" w="9525">
+                <a14:hiddenLine xmlns="" xmlns:a14="http://schemas.microsoft.com/office/drawing/2010/main" w="9525">
                   <a:solidFill>
                     <a:srgbClr val="000000"/>
                   </a:solidFill>
@@ -2353,7 +2353,7 @@
             </a:ln>
             <a:extLst>
               <a:ext uri="{91240B29-F687-4f45-9708-019B960494DF}">
-                <a14:hiddenLine xmlns:a14="http://schemas.microsoft.com/office/drawing/2010/main" xmlns="" w="9525">
+                <a14:hiddenLine xmlns="" xmlns:a14="http://schemas.microsoft.com/office/drawing/2010/main" w="9525">
                   <a:solidFill>
                     <a:srgbClr val="000000"/>
                   </a:solidFill>
@@ -2443,7 +2443,7 @@
             </a:ln>
             <a:extLst>
               <a:ext uri="{91240B29-F687-4f45-9708-019B960494DF}">
-                <a14:hiddenLine xmlns:a14="http://schemas.microsoft.com/office/drawing/2010/main" xmlns="" w="9525">
+                <a14:hiddenLine xmlns="" xmlns:a14="http://schemas.microsoft.com/office/drawing/2010/main" w="9525">
                   <a:solidFill>
                     <a:srgbClr val="000000"/>
                   </a:solidFill>
@@ -2505,7 +2505,7 @@
             </a:ln>
             <a:extLst>
               <a:ext uri="{91240B29-F687-4f45-9708-019B960494DF}">
-                <a14:hiddenLine xmlns:a14="http://schemas.microsoft.com/office/drawing/2010/main" xmlns="" w="9525">
+                <a14:hiddenLine xmlns="" xmlns:a14="http://schemas.microsoft.com/office/drawing/2010/main" w="9525">
                   <a:solidFill>
                     <a:srgbClr val="000000"/>
                   </a:solidFill>
@@ -2567,7 +2567,7 @@
             </a:ln>
             <a:extLst>
               <a:ext uri="{91240B29-F687-4f45-9708-019B960494DF}">
-                <a14:hiddenLine xmlns:a14="http://schemas.microsoft.com/office/drawing/2010/main" xmlns="" w="9525">
+                <a14:hiddenLine xmlns="" xmlns:a14="http://schemas.microsoft.com/office/drawing/2010/main" w="9525">
                   <a:solidFill>
                     <a:srgbClr val="000000"/>
                   </a:solidFill>
@@ -2657,7 +2657,7 @@
             </a:ln>
             <a:extLst>
               <a:ext uri="{91240B29-F687-4f45-9708-019B960494DF}">
-                <a14:hiddenLine xmlns:a14="http://schemas.microsoft.com/office/drawing/2010/main" xmlns="" w="9525">
+                <a14:hiddenLine xmlns="" xmlns:a14="http://schemas.microsoft.com/office/drawing/2010/main" w="9525">
                   <a:solidFill>
                     <a:srgbClr val="000000"/>
                   </a:solidFill>
@@ -2725,7 +2725,7 @@
             </a:ln>
             <a:extLst>
               <a:ext uri="{91240B29-F687-4f45-9708-019B960494DF}">
-                <a14:hiddenLine xmlns:a14="http://schemas.microsoft.com/office/drawing/2010/main" xmlns="" w="9525">
+                <a14:hiddenLine xmlns="" xmlns:a14="http://schemas.microsoft.com/office/drawing/2010/main" w="9525">
                   <a:solidFill>
                     <a:srgbClr val="000000"/>
                   </a:solidFill>
@@ -2787,7 +2787,7 @@
             </a:ln>
             <a:extLst>
               <a:ext uri="{91240B29-F687-4f45-9708-019B960494DF}">
-                <a14:hiddenLine xmlns:a14="http://schemas.microsoft.com/office/drawing/2010/main" xmlns="" w="9525">
+                <a14:hiddenLine xmlns="" xmlns:a14="http://schemas.microsoft.com/office/drawing/2010/main" w="9525">
                   <a:solidFill>
                     <a:srgbClr val="000000"/>
                   </a:solidFill>
@@ -2877,7 +2877,7 @@
             </a:ln>
             <a:extLst>
               <a:ext uri="{91240B29-F687-4f45-9708-019B960494DF}">
-                <a14:hiddenLine xmlns:a14="http://schemas.microsoft.com/office/drawing/2010/main" xmlns="" w="9525">
+                <a14:hiddenLine xmlns="" xmlns:a14="http://schemas.microsoft.com/office/drawing/2010/main" w="9525">
                   <a:solidFill>
                     <a:srgbClr val="000000"/>
                   </a:solidFill>
@@ -2939,7 +2939,7 @@
             </a:ln>
             <a:extLst>
               <a:ext uri="{91240B29-F687-4f45-9708-019B960494DF}">
-                <a14:hiddenLine xmlns:a14="http://schemas.microsoft.com/office/drawing/2010/main" xmlns="" w="9525">
+                <a14:hiddenLine xmlns="" xmlns:a14="http://schemas.microsoft.com/office/drawing/2010/main" w="9525">
                   <a:solidFill>
                     <a:srgbClr val="000000"/>
                   </a:solidFill>
@@ -3029,7 +3029,7 @@
             </a:ln>
             <a:extLst>
               <a:ext uri="{91240B29-F687-4f45-9708-019B960494DF}">
-                <a14:hiddenLine xmlns:a14="http://schemas.microsoft.com/office/drawing/2010/main" xmlns="" w="9525">
+                <a14:hiddenLine xmlns="" xmlns:a14="http://schemas.microsoft.com/office/drawing/2010/main" w="9525">
                   <a:solidFill>
                     <a:srgbClr val="000000"/>
                   </a:solidFill>
@@ -3091,7 +3091,7 @@
             </a:ln>
             <a:extLst>
               <a:ext uri="{91240B29-F687-4f45-9708-019B960494DF}">
-                <a14:hiddenLine xmlns:a14="http://schemas.microsoft.com/office/drawing/2010/main" xmlns="" w="9525">
+                <a14:hiddenLine xmlns="" xmlns:a14="http://schemas.microsoft.com/office/drawing/2010/main" w="9525">
                   <a:solidFill>
                     <a:srgbClr val="000000"/>
                   </a:solidFill>
@@ -3181,7 +3181,7 @@
             </a:ln>
             <a:extLst>
               <a:ext uri="{91240B29-F687-4f45-9708-019B960494DF}">
-                <a14:hiddenLine xmlns:a14="http://schemas.microsoft.com/office/drawing/2010/main" xmlns="" w="9525">
+                <a14:hiddenLine xmlns="" xmlns:a14="http://schemas.microsoft.com/office/drawing/2010/main" w="9525">
                   <a:solidFill>
                     <a:srgbClr val="000000"/>
                   </a:solidFill>
@@ -3215,7 +3215,7 @@
             </a:ln>
             <a:extLst>
               <a:ext uri="{91240B29-F687-4f45-9708-019B960494DF}">
-                <a14:hiddenLine xmlns:a14="http://schemas.microsoft.com/office/drawing/2010/main" xmlns="" w="9525">
+                <a14:hiddenLine xmlns="" xmlns:a14="http://schemas.microsoft.com/office/drawing/2010/main" w="9525">
                   <a:solidFill>
                     <a:srgbClr val="000000"/>
                   </a:solidFill>
@@ -3280,7 +3280,7 @@
             </a:ln>
             <a:extLst>
               <a:ext uri="{91240B29-F687-4f45-9708-019B960494DF}">
-                <a14:hiddenLine xmlns:a14="http://schemas.microsoft.com/office/drawing/2010/main" xmlns="" w="9525">
+                <a14:hiddenLine xmlns="" xmlns:a14="http://schemas.microsoft.com/office/drawing/2010/main" w="9525">
                   <a:solidFill>
                     <a:srgbClr val="000000"/>
                   </a:solidFill>
@@ -3370,7 +3370,7 @@
             </a:ln>
             <a:extLst>
               <a:ext uri="{91240B29-F687-4f45-9708-019B960494DF}">
-                <a14:hiddenLine xmlns:a14="http://schemas.microsoft.com/office/drawing/2010/main" xmlns="" w="9525">
+                <a14:hiddenLine xmlns="" xmlns:a14="http://schemas.microsoft.com/office/drawing/2010/main" w="9525">
                   <a:solidFill>
                     <a:srgbClr val="000000"/>
                   </a:solidFill>
@@ -3432,7 +3432,7 @@
             </a:ln>
             <a:extLst>
               <a:ext uri="{91240B29-F687-4f45-9708-019B960494DF}">
-                <a14:hiddenLine xmlns:a14="http://schemas.microsoft.com/office/drawing/2010/main" xmlns="" w="9525">
+                <a14:hiddenLine xmlns="" xmlns:a14="http://schemas.microsoft.com/office/drawing/2010/main" w="9525">
                   <a:solidFill>
                     <a:srgbClr val="000000"/>
                   </a:solidFill>
@@ -3522,7 +3522,7 @@
             </a:ln>
             <a:extLst>
               <a:ext uri="{91240B29-F687-4f45-9708-019B960494DF}">
-                <a14:hiddenLine xmlns:a14="http://schemas.microsoft.com/office/drawing/2010/main" xmlns="" w="9525">
+                <a14:hiddenLine xmlns="" xmlns:a14="http://schemas.microsoft.com/office/drawing/2010/main" w="9525">
                   <a:solidFill>
                     <a:srgbClr val="000000"/>
                   </a:solidFill>
@@ -3612,7 +3612,7 @@
             </a:ln>
             <a:extLst>
               <a:ext uri="{91240B29-F687-4f45-9708-019B960494DF}">
-                <a14:hiddenLine xmlns:a14="http://schemas.microsoft.com/office/drawing/2010/main" xmlns="" w="9525">
+                <a14:hiddenLine xmlns="" xmlns:a14="http://schemas.microsoft.com/office/drawing/2010/main" w="9525">
                   <a:solidFill>
                     <a:srgbClr val="000000"/>
                   </a:solidFill>
@@ -3677,7 +3677,7 @@
             </a:ln>
             <a:extLst>
               <a:ext uri="{91240B29-F687-4f45-9708-019B960494DF}">
-                <a14:hiddenLine xmlns:a14="http://schemas.microsoft.com/office/drawing/2010/main" xmlns="" w="9525">
+                <a14:hiddenLine xmlns="" xmlns:a14="http://schemas.microsoft.com/office/drawing/2010/main" w="9525">
                   <a:solidFill>
                     <a:srgbClr val="000000"/>
                   </a:solidFill>
@@ -3739,7 +3739,7 @@
             </a:ln>
             <a:extLst>
               <a:ext uri="{91240B29-F687-4f45-9708-019B960494DF}">
-                <a14:hiddenLine xmlns:a14="http://schemas.microsoft.com/office/drawing/2010/main" xmlns="" w="9525">
+                <a14:hiddenLine xmlns="" xmlns:a14="http://schemas.microsoft.com/office/drawing/2010/main" w="9525">
                   <a:solidFill>
                     <a:srgbClr val="000000"/>
                   </a:solidFill>
@@ -3829,7 +3829,7 @@
             </a:ln>
             <a:extLst>
               <a:ext uri="{91240B29-F687-4f45-9708-019B960494DF}">
-                <a14:hiddenLine xmlns:a14="http://schemas.microsoft.com/office/drawing/2010/main" xmlns="" w="9525">
+                <a14:hiddenLine xmlns="" xmlns:a14="http://schemas.microsoft.com/office/drawing/2010/main" w="9525">
                   <a:solidFill>
                     <a:srgbClr val="000000"/>
                   </a:solidFill>
@@ -3919,7 +3919,7 @@
             </a:ln>
             <a:extLst>
               <a:ext uri="{91240B29-F687-4f45-9708-019B960494DF}">
-                <a14:hiddenLine xmlns:a14="http://schemas.microsoft.com/office/drawing/2010/main" xmlns="" w="9525">
+                <a14:hiddenLine xmlns="" xmlns:a14="http://schemas.microsoft.com/office/drawing/2010/main" w="9525">
                   <a:solidFill>
                     <a:srgbClr val="000000"/>
                   </a:solidFill>
@@ -3981,7 +3981,7 @@
             </a:ln>
             <a:extLst>
               <a:ext uri="{91240B29-F687-4f45-9708-019B960494DF}">
-                <a14:hiddenLine xmlns:a14="http://schemas.microsoft.com/office/drawing/2010/main" xmlns="" w="9525">
+                <a14:hiddenLine xmlns="" xmlns:a14="http://schemas.microsoft.com/office/drawing/2010/main" w="9525">
                   <a:solidFill>
                     <a:srgbClr val="000000"/>
                   </a:solidFill>
@@ -4101,7 +4101,7 @@
             </a:ln>
             <a:extLst>
               <a:ext uri="{91240B29-F687-4f45-9708-019B960494DF}">
-                <a14:hiddenLine xmlns:a14="http://schemas.microsoft.com/office/drawing/2010/main" xmlns="" w="9525">
+                <a14:hiddenLine xmlns="" xmlns:a14="http://schemas.microsoft.com/office/drawing/2010/main" w="9525">
                   <a:solidFill>
                     <a:srgbClr val="000000"/>
                   </a:solidFill>
@@ -4169,7 +4169,7 @@
             </a:ln>
             <a:extLst>
               <a:ext uri="{91240B29-F687-4f45-9708-019B960494DF}">
-                <a14:hiddenLine xmlns:a14="http://schemas.microsoft.com/office/drawing/2010/main" xmlns="" w="9525">
+                <a14:hiddenLine xmlns="" xmlns:a14="http://schemas.microsoft.com/office/drawing/2010/main" w="9525">
                   <a:solidFill>
                     <a:srgbClr val="000000"/>
                   </a:solidFill>
@@ -4259,7 +4259,7 @@
             </a:ln>
             <a:extLst>
               <a:ext uri="{91240B29-F687-4f45-9708-019B960494DF}">
-                <a14:hiddenLine xmlns:a14="http://schemas.microsoft.com/office/drawing/2010/main" xmlns="" w="9525">
+                <a14:hiddenLine xmlns="" xmlns:a14="http://schemas.microsoft.com/office/drawing/2010/main" w="9525">
                   <a:solidFill>
                     <a:srgbClr val="000000"/>
                   </a:solidFill>
@@ -4399,7 +4399,7 @@
           <a:p>
             <a:fld id="{48A87A34-81AB-432B-8DAE-1953F412C126}" type="datetimeFigureOut">
               <a:rPr lang="en-US" dirty="0"/>
-              <a:t>12/16/2017</a:t>
+              <a:t>1/8/2018</a:t>
             </a:fld>
             <a:endParaRPr lang="en-US" dirty="0"/>
           </a:p>
@@ -4661,7 +4661,7 @@
           <a:p>
             <a:fld id="{48A87A34-81AB-432B-8DAE-1953F412C126}" type="datetimeFigureOut">
               <a:rPr lang="en-US" dirty="0"/>
-              <a:t>12/16/2017</a:t>
+              <a:t>1/8/2018</a:t>
             </a:fld>
             <a:endParaRPr lang="en-US" dirty="0"/>
           </a:p>
@@ -4852,7 +4852,7 @@
           <a:p>
             <a:fld id="{48A87A34-81AB-432B-8DAE-1953F412C126}" type="datetimeFigureOut">
               <a:rPr lang="en-US" dirty="0"/>
-              <a:t>12/16/2017</a:t>
+              <a:t>1/8/2018</a:t>
             </a:fld>
             <a:endParaRPr lang="en-US" dirty="0"/>
           </a:p>
@@ -5110,7 +5110,7 @@
           <a:p>
             <a:fld id="{48A87A34-81AB-432B-8DAE-1953F412C126}" type="datetimeFigureOut">
               <a:rPr lang="en-US" dirty="0"/>
-              <a:t>12/16/2017</a:t>
+              <a:t>1/8/2018</a:t>
             </a:fld>
             <a:endParaRPr lang="en-US" dirty="0"/>
           </a:p>
@@ -5539,7 +5539,7 @@
           <a:p>
             <a:fld id="{48A87A34-81AB-432B-8DAE-1953F412C126}" type="datetimeFigureOut">
               <a:rPr lang="en-US" dirty="0"/>
-              <a:t>12/16/2017</a:t>
+              <a:t>1/8/2018</a:t>
             </a:fld>
             <a:endParaRPr lang="en-US" dirty="0"/>
           </a:p>
@@ -6080,7 +6080,7 @@
           <a:p>
             <a:fld id="{48A87A34-81AB-432B-8DAE-1953F412C126}" type="datetimeFigureOut">
               <a:rPr lang="en-US" dirty="0"/>
-              <a:t>12/16/2017</a:t>
+              <a:t>1/8/2018</a:t>
             </a:fld>
             <a:endParaRPr lang="en-US" dirty="0"/>
           </a:p>
@@ -6795,7 +6795,7 @@
           <a:p>
             <a:fld id="{48A87A34-81AB-432B-8DAE-1953F412C126}" type="datetimeFigureOut">
               <a:rPr lang="en-US" dirty="0"/>
-              <a:t>12/16/2017</a:t>
+              <a:t>1/8/2018</a:t>
             </a:fld>
             <a:endParaRPr lang="en-US" dirty="0"/>
           </a:p>
@@ -6960,7 +6960,7 @@
           <a:p>
             <a:fld id="{48A87A34-81AB-432B-8DAE-1953F412C126}" type="datetimeFigureOut">
               <a:rPr lang="en-US" dirty="0"/>
-              <a:t>12/16/2017</a:t>
+              <a:t>1/8/2018</a:t>
             </a:fld>
             <a:endParaRPr lang="en-US" dirty="0"/>
           </a:p>
@@ -7135,7 +7135,7 @@
           <a:p>
             <a:fld id="{48A87A34-81AB-432B-8DAE-1953F412C126}" type="datetimeFigureOut">
               <a:rPr lang="en-US" dirty="0"/>
-              <a:t>12/16/2017</a:t>
+              <a:t>1/8/2018</a:t>
             </a:fld>
             <a:endParaRPr lang="en-US" dirty="0"/>
           </a:p>
@@ -7300,7 +7300,7 @@
           <a:p>
             <a:fld id="{48A87A34-81AB-432B-8DAE-1953F412C126}" type="datetimeFigureOut">
               <a:rPr lang="en-US" dirty="0"/>
-              <a:t>12/16/2017</a:t>
+              <a:t>1/8/2018</a:t>
             </a:fld>
             <a:endParaRPr lang="en-US" dirty="0"/>
           </a:p>
@@ -7545,7 +7545,7 @@
           <a:p>
             <a:fld id="{48A87A34-81AB-432B-8DAE-1953F412C126}" type="datetimeFigureOut">
               <a:rPr lang="en-US" dirty="0"/>
-              <a:t>12/16/2017</a:t>
+              <a:t>1/8/2018</a:t>
             </a:fld>
             <a:endParaRPr lang="en-US" dirty="0"/>
           </a:p>
@@ -7772,7 +7772,7 @@
           <a:p>
             <a:fld id="{48A87A34-81AB-432B-8DAE-1953F412C126}" type="datetimeFigureOut">
               <a:rPr lang="en-US" dirty="0"/>
-              <a:t>12/16/2017</a:t>
+              <a:t>1/8/2018</a:t>
             </a:fld>
             <a:endParaRPr lang="en-US" dirty="0"/>
           </a:p>
@@ -8148,7 +8148,7 @@
           <a:p>
             <a:fld id="{48A87A34-81AB-432B-8DAE-1953F412C126}" type="datetimeFigureOut">
               <a:rPr lang="en-US" dirty="0"/>
-              <a:t>12/16/2017</a:t>
+              <a:t>1/8/2018</a:t>
             </a:fld>
             <a:endParaRPr lang="en-US" dirty="0"/>
           </a:p>
@@ -8261,7 +8261,7 @@
           <a:p>
             <a:fld id="{48A87A34-81AB-432B-8DAE-1953F412C126}" type="datetimeFigureOut">
               <a:rPr lang="en-US" dirty="0"/>
-              <a:t>12/16/2017</a:t>
+              <a:t>1/8/2018</a:t>
             </a:fld>
             <a:endParaRPr lang="en-US" dirty="0"/>
           </a:p>
@@ -8351,7 +8351,7 @@
           <a:p>
             <a:fld id="{48A87A34-81AB-432B-8DAE-1953F412C126}" type="datetimeFigureOut">
               <a:rPr lang="en-US" dirty="0"/>
-              <a:t>12/16/2017</a:t>
+              <a:t>1/8/2018</a:t>
             </a:fld>
             <a:endParaRPr lang="en-US" dirty="0"/>
           </a:p>
@@ -8595,7 +8595,7 @@
           <a:p>
             <a:fld id="{48A87A34-81AB-432B-8DAE-1953F412C126}" type="datetimeFigureOut">
               <a:rPr lang="en-US" dirty="0"/>
-              <a:t>12/16/2017</a:t>
+              <a:t>1/8/2018</a:t>
             </a:fld>
             <a:endParaRPr lang="en-US" dirty="0"/>
           </a:p>
@@ -8870,7 +8870,7 @@
           <a:p>
             <a:fld id="{48A87A34-81AB-432B-8DAE-1953F412C126}" type="datetimeFigureOut">
               <a:rPr lang="en-US" dirty="0"/>
-              <a:t>12/16/2017</a:t>
+              <a:t>1/8/2018</a:t>
             </a:fld>
             <a:endParaRPr lang="en-US" dirty="0"/>
           </a:p>
@@ -8981,7 +8981,7 @@
           <a:noFill/>
           <a:extLst>
             <a:ext uri="{909E8E84-426E-40dd-AFC4-6F175D3DCCD1}">
-              <a14:hiddenFill xmlns:a14="http://schemas.microsoft.com/office/drawing/2010/main" xmlns="">
+              <a14:hiddenFill xmlns="" xmlns:a14="http://schemas.microsoft.com/office/drawing/2010/main">
                 <a:solidFill>
                   <a:srgbClr val="FFFFFF"/>
                 </a:solidFill>
@@ -9055,7 +9055,7 @@
               </a:ln>
               <a:extLst>
                 <a:ext uri="{91240B29-F687-4f45-9708-019B960494DF}">
-                  <a14:hiddenLine xmlns:a14="http://schemas.microsoft.com/office/drawing/2010/main" xmlns="" w="9525">
+                  <a14:hiddenLine xmlns="" xmlns:a14="http://schemas.microsoft.com/office/drawing/2010/main" w="9525">
                     <a:solidFill>
                       <a:srgbClr val="000000"/>
                     </a:solidFill>
@@ -9145,7 +9145,7 @@
               </a:ln>
               <a:extLst>
                 <a:ext uri="{91240B29-F687-4f45-9708-019B960494DF}">
-                  <a14:hiddenLine xmlns:a14="http://schemas.microsoft.com/office/drawing/2010/main" xmlns="" w="9525">
+                  <a14:hiddenLine xmlns="" xmlns:a14="http://schemas.microsoft.com/office/drawing/2010/main" w="9525">
                     <a:solidFill>
                       <a:srgbClr val="000000"/>
                     </a:solidFill>
@@ -9235,7 +9235,7 @@
               </a:ln>
               <a:extLst>
                 <a:ext uri="{91240B29-F687-4f45-9708-019B960494DF}">
-                  <a14:hiddenLine xmlns:a14="http://schemas.microsoft.com/office/drawing/2010/main" xmlns="" w="9525">
+                  <a14:hiddenLine xmlns="" xmlns:a14="http://schemas.microsoft.com/office/drawing/2010/main" w="9525">
                     <a:solidFill>
                       <a:srgbClr val="000000"/>
                     </a:solidFill>
@@ -9297,7 +9297,7 @@
               </a:ln>
               <a:extLst>
                 <a:ext uri="{91240B29-F687-4f45-9708-019B960494DF}">
-                  <a14:hiddenLine xmlns:a14="http://schemas.microsoft.com/office/drawing/2010/main" xmlns="" w="9525">
+                  <a14:hiddenLine xmlns="" xmlns:a14="http://schemas.microsoft.com/office/drawing/2010/main" w="9525">
                     <a:solidFill>
                       <a:srgbClr val="000000"/>
                     </a:solidFill>
@@ -9387,7 +9387,7 @@
               </a:ln>
               <a:extLst>
                 <a:ext uri="{91240B29-F687-4f45-9708-019B960494DF}">
-                  <a14:hiddenLine xmlns:a14="http://schemas.microsoft.com/office/drawing/2010/main" xmlns="" w="9525">
+                  <a14:hiddenLine xmlns="" xmlns:a14="http://schemas.microsoft.com/office/drawing/2010/main" w="9525">
                     <a:solidFill>
                       <a:srgbClr val="000000"/>
                     </a:solidFill>
@@ -9449,7 +9449,7 @@
               </a:ln>
               <a:extLst>
                 <a:ext uri="{91240B29-F687-4f45-9708-019B960494DF}">
-                  <a14:hiddenLine xmlns:a14="http://schemas.microsoft.com/office/drawing/2010/main" xmlns="" w="9525">
+                  <a14:hiddenLine xmlns="" xmlns:a14="http://schemas.microsoft.com/office/drawing/2010/main" w="9525">
                     <a:solidFill>
                       <a:srgbClr val="000000"/>
                     </a:solidFill>
@@ -9511,7 +9511,7 @@
               </a:ln>
               <a:extLst>
                 <a:ext uri="{91240B29-F687-4f45-9708-019B960494DF}">
-                  <a14:hiddenLine xmlns:a14="http://schemas.microsoft.com/office/drawing/2010/main" xmlns="" w="9525">
+                  <a14:hiddenLine xmlns="" xmlns:a14="http://schemas.microsoft.com/office/drawing/2010/main" w="9525">
                     <a:solidFill>
                       <a:srgbClr val="000000"/>
                     </a:solidFill>
@@ -9601,7 +9601,7 @@
               </a:ln>
               <a:extLst>
                 <a:ext uri="{91240B29-F687-4f45-9708-019B960494DF}">
-                  <a14:hiddenLine xmlns:a14="http://schemas.microsoft.com/office/drawing/2010/main" xmlns="" w="9525">
+                  <a14:hiddenLine xmlns="" xmlns:a14="http://schemas.microsoft.com/office/drawing/2010/main" w="9525">
                     <a:solidFill>
                       <a:srgbClr val="000000"/>
                     </a:solidFill>
@@ -9691,7 +9691,7 @@
               </a:ln>
               <a:extLst>
                 <a:ext uri="{91240B29-F687-4f45-9708-019B960494DF}">
-                  <a14:hiddenLine xmlns:a14="http://schemas.microsoft.com/office/drawing/2010/main" xmlns="" w="9525">
+                  <a14:hiddenLine xmlns="" xmlns:a14="http://schemas.microsoft.com/office/drawing/2010/main" w="9525">
                     <a:solidFill>
                       <a:srgbClr val="000000"/>
                     </a:solidFill>
@@ -9753,7 +9753,7 @@
               </a:ln>
               <a:extLst>
                 <a:ext uri="{91240B29-F687-4f45-9708-019B960494DF}">
-                  <a14:hiddenLine xmlns:a14="http://schemas.microsoft.com/office/drawing/2010/main" xmlns="" w="9525">
+                  <a14:hiddenLine xmlns="" xmlns:a14="http://schemas.microsoft.com/office/drawing/2010/main" w="9525">
                     <a:solidFill>
                       <a:srgbClr val="000000"/>
                     </a:solidFill>
@@ -9863,7 +9863,7 @@
               </a:ln>
               <a:extLst>
                 <a:ext uri="{91240B29-F687-4f45-9708-019B960494DF}">
-                  <a14:hiddenLine xmlns:a14="http://schemas.microsoft.com/office/drawing/2010/main" xmlns="" w="9525">
+                  <a14:hiddenLine xmlns="" xmlns:a14="http://schemas.microsoft.com/office/drawing/2010/main" w="9525">
                     <a:solidFill>
                       <a:srgbClr val="000000"/>
                     </a:solidFill>
@@ -9947,7 +9947,7 @@
               </a:ln>
               <a:extLst>
                 <a:ext uri="{91240B29-F687-4f45-9708-019B960494DF}">
-                  <a14:hiddenLine xmlns:a14="http://schemas.microsoft.com/office/drawing/2010/main" xmlns="" w="9525">
+                  <a14:hiddenLine xmlns="" xmlns:a14="http://schemas.microsoft.com/office/drawing/2010/main" w="9525">
                     <a:solidFill>
                       <a:srgbClr val="000000"/>
                     </a:solidFill>
@@ -10009,7 +10009,7 @@
               </a:ln>
               <a:extLst>
                 <a:ext uri="{91240B29-F687-4f45-9708-019B960494DF}">
-                  <a14:hiddenLine xmlns:a14="http://schemas.microsoft.com/office/drawing/2010/main" xmlns="" w="9525">
+                  <a14:hiddenLine xmlns="" xmlns:a14="http://schemas.microsoft.com/office/drawing/2010/main" w="9525">
                     <a:solidFill>
                       <a:srgbClr val="000000"/>
                     </a:solidFill>
@@ -10071,7 +10071,7 @@
               </a:ln>
               <a:extLst>
                 <a:ext uri="{91240B29-F687-4f45-9708-019B960494DF}">
-                  <a14:hiddenLine xmlns:a14="http://schemas.microsoft.com/office/drawing/2010/main" xmlns="" w="9525">
+                  <a14:hiddenLine xmlns="" xmlns:a14="http://schemas.microsoft.com/office/drawing/2010/main" w="9525">
                     <a:solidFill>
                       <a:srgbClr val="000000"/>
                     </a:solidFill>
@@ -10161,7 +10161,7 @@
               </a:ln>
               <a:extLst>
                 <a:ext uri="{91240B29-F687-4f45-9708-019B960494DF}">
-                  <a14:hiddenLine xmlns:a14="http://schemas.microsoft.com/office/drawing/2010/main" xmlns="" w="9525">
+                  <a14:hiddenLine xmlns="" xmlns:a14="http://schemas.microsoft.com/office/drawing/2010/main" w="9525">
                     <a:solidFill>
                       <a:srgbClr val="000000"/>
                     </a:solidFill>
@@ -10195,7 +10195,7 @@
               </a:ln>
               <a:extLst>
                 <a:ext uri="{91240B29-F687-4f45-9708-019B960494DF}">
-                  <a14:hiddenLine xmlns:a14="http://schemas.microsoft.com/office/drawing/2010/main" xmlns="" w="9525">
+                  <a14:hiddenLine xmlns="" xmlns:a14="http://schemas.microsoft.com/office/drawing/2010/main" w="9525">
                     <a:solidFill>
                       <a:srgbClr val="000000"/>
                     </a:solidFill>
@@ -10260,7 +10260,7 @@
               </a:ln>
               <a:extLst>
                 <a:ext uri="{91240B29-F687-4f45-9708-019B960494DF}">
-                  <a14:hiddenLine xmlns:a14="http://schemas.microsoft.com/office/drawing/2010/main" xmlns="" w="9525">
+                  <a14:hiddenLine xmlns="" xmlns:a14="http://schemas.microsoft.com/office/drawing/2010/main" w="9525">
                     <a:solidFill>
                       <a:srgbClr val="000000"/>
                     </a:solidFill>
@@ -10350,7 +10350,7 @@
               </a:ln>
               <a:extLst>
                 <a:ext uri="{91240B29-F687-4f45-9708-019B960494DF}">
-                  <a14:hiddenLine xmlns:a14="http://schemas.microsoft.com/office/drawing/2010/main" xmlns="" w="9525">
+                  <a14:hiddenLine xmlns="" xmlns:a14="http://schemas.microsoft.com/office/drawing/2010/main" w="9525">
                     <a:solidFill>
                       <a:srgbClr val="000000"/>
                     </a:solidFill>
@@ -10412,7 +10412,7 @@
               </a:ln>
               <a:extLst>
                 <a:ext uri="{91240B29-F687-4f45-9708-019B960494DF}">
-                  <a14:hiddenLine xmlns:a14="http://schemas.microsoft.com/office/drawing/2010/main" xmlns="" w="9525">
+                  <a14:hiddenLine xmlns="" xmlns:a14="http://schemas.microsoft.com/office/drawing/2010/main" w="9525">
                     <a:solidFill>
                       <a:srgbClr val="000000"/>
                     </a:solidFill>
@@ -10502,7 +10502,7 @@
               </a:ln>
               <a:extLst>
                 <a:ext uri="{91240B29-F687-4f45-9708-019B960494DF}">
-                  <a14:hiddenLine xmlns:a14="http://schemas.microsoft.com/office/drawing/2010/main" xmlns="" w="9525">
+                  <a14:hiddenLine xmlns="" xmlns:a14="http://schemas.microsoft.com/office/drawing/2010/main" w="9525">
                     <a:solidFill>
                       <a:srgbClr val="000000"/>
                     </a:solidFill>
@@ -10567,7 +10567,7 @@
               </a:ln>
               <a:extLst>
                 <a:ext uri="{91240B29-F687-4f45-9708-019B960494DF}">
-                  <a14:hiddenLine xmlns:a14="http://schemas.microsoft.com/office/drawing/2010/main" xmlns="" w="9525">
+                  <a14:hiddenLine xmlns="" xmlns:a14="http://schemas.microsoft.com/office/drawing/2010/main" w="9525">
                     <a:solidFill>
                       <a:srgbClr val="000000"/>
                     </a:solidFill>
@@ -10629,7 +10629,7 @@
               </a:ln>
               <a:extLst>
                 <a:ext uri="{91240B29-F687-4f45-9708-019B960494DF}">
-                  <a14:hiddenLine xmlns:a14="http://schemas.microsoft.com/office/drawing/2010/main" xmlns="" w="9525">
+                  <a14:hiddenLine xmlns="" xmlns:a14="http://schemas.microsoft.com/office/drawing/2010/main" w="9525">
                     <a:solidFill>
                       <a:srgbClr val="000000"/>
                     </a:solidFill>
@@ -10719,7 +10719,7 @@
               </a:ln>
               <a:extLst>
                 <a:ext uri="{91240B29-F687-4f45-9708-019B960494DF}">
-                  <a14:hiddenLine xmlns:a14="http://schemas.microsoft.com/office/drawing/2010/main" xmlns="" w="9525">
+                  <a14:hiddenLine xmlns="" xmlns:a14="http://schemas.microsoft.com/office/drawing/2010/main" w="9525">
                     <a:solidFill>
                       <a:srgbClr val="000000"/>
                     </a:solidFill>
@@ -10809,7 +10809,7 @@
               </a:ln>
               <a:extLst>
                 <a:ext uri="{91240B29-F687-4f45-9708-019B960494DF}">
-                  <a14:hiddenLine xmlns:a14="http://schemas.microsoft.com/office/drawing/2010/main" xmlns="" w="9525">
+                  <a14:hiddenLine xmlns="" xmlns:a14="http://schemas.microsoft.com/office/drawing/2010/main" w="9525">
                     <a:solidFill>
                       <a:srgbClr val="000000"/>
                     </a:solidFill>
@@ -10874,7 +10874,7 @@
               </a:ln>
               <a:extLst>
                 <a:ext uri="{91240B29-F687-4f45-9708-019B960494DF}">
-                  <a14:hiddenLine xmlns:a14="http://schemas.microsoft.com/office/drawing/2010/main" xmlns="" w="9525">
+                  <a14:hiddenLine xmlns="" xmlns:a14="http://schemas.microsoft.com/office/drawing/2010/main" w="9525">
                     <a:solidFill>
                       <a:srgbClr val="000000"/>
                     </a:solidFill>
@@ -10994,7 +10994,7 @@
               </a:ln>
               <a:extLst>
                 <a:ext uri="{91240B29-F687-4f45-9708-019B960494DF}">
-                  <a14:hiddenLine xmlns:a14="http://schemas.microsoft.com/office/drawing/2010/main" xmlns="" w="9525">
+                  <a14:hiddenLine xmlns="" xmlns:a14="http://schemas.microsoft.com/office/drawing/2010/main" w="9525">
                     <a:solidFill>
                       <a:srgbClr val="000000"/>
                     </a:solidFill>
@@ -11092,7 +11092,7 @@
               </a:ln>
               <a:extLst>
                 <a:ext uri="{91240B29-F687-4f45-9708-019B960494DF}">
-                  <a14:hiddenLine xmlns:a14="http://schemas.microsoft.com/office/drawing/2010/main" xmlns="" w="9525">
+                  <a14:hiddenLine xmlns="" xmlns:a14="http://schemas.microsoft.com/office/drawing/2010/main" w="9525">
                     <a:solidFill>
                       <a:srgbClr val="000000"/>
                     </a:solidFill>
@@ -11207,7 +11207,7 @@
               </a:ln>
               <a:extLst>
                 <a:ext uri="{91240B29-F687-4f45-9708-019B960494DF}">
-                  <a14:hiddenLine xmlns:a14="http://schemas.microsoft.com/office/drawing/2010/main" xmlns="" w="9525">
+                  <a14:hiddenLine xmlns="" xmlns:a14="http://schemas.microsoft.com/office/drawing/2010/main" w="9525">
                     <a:solidFill>
                       <a:srgbClr val="000000"/>
                     </a:solidFill>
@@ -11297,7 +11297,7 @@
               </a:ln>
               <a:extLst>
                 <a:ext uri="{91240B29-F687-4f45-9708-019B960494DF}">
-                  <a14:hiddenLine xmlns:a14="http://schemas.microsoft.com/office/drawing/2010/main" xmlns="" w="9525">
+                  <a14:hiddenLine xmlns="" xmlns:a14="http://schemas.microsoft.com/office/drawing/2010/main" w="9525">
                     <a:solidFill>
                       <a:srgbClr val="000000"/>
                     </a:solidFill>
@@ -11362,7 +11362,7 @@
               </a:ln>
               <a:extLst>
                 <a:ext uri="{91240B29-F687-4f45-9708-019B960494DF}">
-                  <a14:hiddenLine xmlns:a14="http://schemas.microsoft.com/office/drawing/2010/main" xmlns="" w="9525">
+                  <a14:hiddenLine xmlns="" xmlns:a14="http://schemas.microsoft.com/office/drawing/2010/main" w="9525">
                     <a:solidFill>
                       <a:srgbClr val="000000"/>
                     </a:solidFill>
@@ -11452,7 +11452,7 @@
               </a:ln>
               <a:extLst>
                 <a:ext uri="{91240B29-F687-4f45-9708-019B960494DF}">
-                  <a14:hiddenLine xmlns:a14="http://schemas.microsoft.com/office/drawing/2010/main" xmlns="" w="9525">
+                  <a14:hiddenLine xmlns="" xmlns:a14="http://schemas.microsoft.com/office/drawing/2010/main" w="9525">
                     <a:solidFill>
                       <a:srgbClr val="000000"/>
                     </a:solidFill>
@@ -11520,7 +11520,7 @@
               </a:ln>
               <a:extLst>
                 <a:ext uri="{91240B29-F687-4f45-9708-019B960494DF}">
-                  <a14:hiddenLine xmlns:a14="http://schemas.microsoft.com/office/drawing/2010/main" xmlns="" w="9525">
+                  <a14:hiddenLine xmlns="" xmlns:a14="http://schemas.microsoft.com/office/drawing/2010/main" w="9525">
                     <a:solidFill>
                       <a:srgbClr val="000000"/>
                     </a:solidFill>
@@ -11610,7 +11610,7 @@
               </a:ln>
               <a:extLst>
                 <a:ext uri="{91240B29-F687-4f45-9708-019B960494DF}">
-                  <a14:hiddenLine xmlns:a14="http://schemas.microsoft.com/office/drawing/2010/main" xmlns="" w="9525">
+                  <a14:hiddenLine xmlns="" xmlns:a14="http://schemas.microsoft.com/office/drawing/2010/main" w="9525">
                     <a:solidFill>
                       <a:srgbClr val="000000"/>
                     </a:solidFill>
@@ -11678,7 +11678,7 @@
               </a:ln>
               <a:extLst>
                 <a:ext uri="{91240B29-F687-4f45-9708-019B960494DF}">
-                  <a14:hiddenLine xmlns:a14="http://schemas.microsoft.com/office/drawing/2010/main" xmlns="" w="9525">
+                  <a14:hiddenLine xmlns="" xmlns:a14="http://schemas.microsoft.com/office/drawing/2010/main" w="9525">
                     <a:solidFill>
                       <a:srgbClr val="000000"/>
                     </a:solidFill>
@@ -11768,7 +11768,7 @@
               </a:ln>
               <a:extLst>
                 <a:ext uri="{91240B29-F687-4f45-9708-019B960494DF}">
-                  <a14:hiddenLine xmlns:a14="http://schemas.microsoft.com/office/drawing/2010/main" xmlns="" w="9525">
+                  <a14:hiddenLine xmlns="" xmlns:a14="http://schemas.microsoft.com/office/drawing/2010/main" w="9525">
                     <a:solidFill>
                       <a:srgbClr val="000000"/>
                     </a:solidFill>
@@ -11802,7 +11802,7 @@
               </a:ln>
               <a:extLst>
                 <a:ext uri="{91240B29-F687-4f45-9708-019B960494DF}">
-                  <a14:hiddenLine xmlns:a14="http://schemas.microsoft.com/office/drawing/2010/main" xmlns="" w="9525">
+                  <a14:hiddenLine xmlns="" xmlns:a14="http://schemas.microsoft.com/office/drawing/2010/main" w="9525">
                     <a:solidFill>
                       <a:srgbClr val="000000"/>
                     </a:solidFill>
@@ -11943,7 +11943,7 @@
             <a:fld id="{48A87A34-81AB-432B-8DAE-1953F412C126}" type="datetimeFigureOut">
               <a:rPr lang="en-US" dirty="0"/>
               <a:pPr/>
-              <a:t>12/16/2017</a:t>
+              <a:t>1/8/2018</a:t>
             </a:fld>
             <a:endParaRPr lang="en-US" dirty="0"/>
           </a:p>
@@ -13571,8 +13571,8 @@
         </p:nvSpPr>
         <p:spPr>
           <a:xfrm>
-            <a:off x="5314985" y="2497014"/>
-            <a:ext cx="1549642" cy="1024752"/>
+            <a:off x="5314984" y="2497014"/>
+            <a:ext cx="1854441" cy="1024752"/>
           </a:xfrm>
         </p:spPr>
         <p:txBody>
@@ -13589,6 +13589,44 @@
               </a:rPr>
               <a:t>DEMO</a:t>
             </a:r>
+          </a:p>
+        </p:txBody>
+      </p:sp>
+      <p:sp>
+        <p:nvSpPr>
+          <p:cNvPr id="4" name="TextBox 3">
+            <a:extLst>
+              <a:ext uri="{FF2B5EF4-FFF2-40B4-BE49-F238E27FC236}">
+                <a16:creationId xmlns:a16="http://schemas.microsoft.com/office/drawing/2014/main" id="{E21C8206-C939-47D4-993A-8870186309E3}"/>
+              </a:ext>
+            </a:extLst>
+          </p:cNvPr>
+          <p:cNvSpPr txBox="1"/>
+          <p:nvPr/>
+        </p:nvSpPr>
+        <p:spPr>
+          <a:xfrm>
+            <a:off x="4625008" y="3260156"/>
+            <a:ext cx="3564835" cy="523220"/>
+          </a:xfrm>
+          <a:prstGeom prst="rect">
+            <a:avLst/>
+          </a:prstGeom>
+          <a:noFill/>
+        </p:spPr>
+        <p:txBody>
+          <a:bodyPr wrap="square" rtlCol="0">
+            <a:spAutoFit/>
+          </a:bodyPr>
+          <a:lstStyle/>
+          <a:p>
+            <a:r>
+              <a:rPr lang="en-US" sz="2800" dirty="0">
+                <a:hlinkClick r:id="rId2"/>
+              </a:rPr>
+              <a:t>http://alice.runcy.me</a:t>
+            </a:r>
+            <a:endParaRPr lang="en-US" sz="2800" dirty="0"/>
           </a:p>
         </p:txBody>
       </p:sp>

</xml_diff>